<commit_message>
New M. Vela talk slides
</commit_message>
<xml_diff>
--- a/Talks/Session1/07_HumanTranslEvaluation.pptx
+++ b/Talks/Session1/07_HumanTranslEvaluation.pptx
@@ -228,7 +228,7 @@
           <a:p>
             <a:fld id="{1825401D-CF70-4861-A49A-D28E3817B4FC}" type="datetimeFigureOut">
               <a:rPr lang="de-DE" smtClean="0"/>
-              <a:t>26.05.2014</a:t>
+              <a:t>28.05.2014</a:t>
             </a:fld>
             <a:endParaRPr lang="de-DE"/>
           </a:p>
@@ -393,7 +393,7 @@
           <a:p>
             <a:fld id="{5E3DCF01-516F-4766-B8E4-825F642B45A0}" type="datetimeFigureOut">
               <a:rPr lang="de-DE" smtClean="0"/>
-              <a:t>26.05.2014</a:t>
+              <a:t>28.05.2014</a:t>
             </a:fld>
             <a:endParaRPr lang="de-DE"/>
           </a:p>
@@ -1959,177 +1959,6 @@
               <a:tabLst/>
               <a:defRPr/>
             </a:pPr>
-            <a:r>
-              <a:rPr lang="de-DE" dirty="0" smtClean="0"/>
-              <a:t>N-gram </a:t>
-            </a:r>
-            <a:r>
-              <a:rPr lang="de-DE" dirty="0" err="1" smtClean="0"/>
-              <a:t>precision</a:t>
-            </a:r>
-            <a:r>
-              <a:rPr lang="de-DE" dirty="0" smtClean="0"/>
-              <a:t> </a:t>
-            </a:r>
-            <a:r>
-              <a:rPr lang="de-DE" dirty="0" err="1" smtClean="0"/>
-              <a:t>by</a:t>
-            </a:r>
-            <a:r>
-              <a:rPr lang="de-DE" dirty="0" smtClean="0"/>
-              <a:t> </a:t>
-            </a:r>
-            <a:r>
-              <a:rPr lang="de-DE" dirty="0" err="1" smtClean="0"/>
-              <a:t>matching</a:t>
-            </a:r>
-            <a:r>
-              <a:rPr lang="de-DE" dirty="0" smtClean="0"/>
-              <a:t> </a:t>
-            </a:r>
-            <a:r>
-              <a:rPr lang="de-DE" dirty="0" err="1" smtClean="0"/>
-              <a:t>hypothesis</a:t>
-            </a:r>
-            <a:r>
-              <a:rPr lang="de-DE" dirty="0" smtClean="0"/>
-              <a:t> </a:t>
-            </a:r>
-            <a:r>
-              <a:rPr lang="de-DE" dirty="0" err="1" smtClean="0"/>
-              <a:t>translations</a:t>
-            </a:r>
-            <a:r>
-              <a:rPr lang="de-DE" dirty="0" smtClean="0"/>
-              <a:t> </a:t>
-            </a:r>
-            <a:r>
-              <a:rPr lang="de-DE" dirty="0" err="1" smtClean="0"/>
-              <a:t>against</a:t>
-            </a:r>
-            <a:r>
-              <a:rPr lang="de-DE" dirty="0" smtClean="0"/>
-              <a:t> 1 </a:t>
-            </a:r>
-            <a:r>
-              <a:rPr lang="de-DE" dirty="0" err="1" smtClean="0"/>
-              <a:t>or</a:t>
-            </a:r>
-            <a:r>
-              <a:rPr lang="de-DE" dirty="0" smtClean="0"/>
-              <a:t> </a:t>
-            </a:r>
-            <a:r>
-              <a:rPr lang="de-DE" dirty="0" err="1" smtClean="0"/>
-              <a:t>more</a:t>
-            </a:r>
-            <a:r>
-              <a:rPr lang="de-DE" dirty="0" smtClean="0"/>
-              <a:t> </a:t>
-            </a:r>
-            <a:r>
-              <a:rPr lang="de-DE" dirty="0" err="1" smtClean="0"/>
-              <a:t>reference</a:t>
-            </a:r>
-            <a:r>
-              <a:rPr lang="de-DE" dirty="0" smtClean="0"/>
-              <a:t> </a:t>
-            </a:r>
-            <a:r>
-              <a:rPr lang="de-DE" dirty="0" err="1" smtClean="0"/>
-              <a:t>translations</a:t>
-            </a:r>
-            <a:r>
-              <a:rPr lang="de-DE" dirty="0" smtClean="0"/>
-              <a:t> </a:t>
-            </a:r>
-          </a:p>
-          <a:p>
-            <a:pPr marL="0" marR="0" lvl="1" indent="0" algn="l" defTabSz="914400" rtl="0" eaLnBrk="1" fontAlgn="auto" latinLnBrk="0" hangingPunct="1">
-              <a:lnSpc>
-                <a:spcPct val="100000"/>
-              </a:lnSpc>
-              <a:spcBef>
-                <a:spcPts val="0"/>
-              </a:spcBef>
-              <a:spcAft>
-                <a:spcPts val="0"/>
-              </a:spcAft>
-              <a:buClrTx/>
-              <a:buSzTx/>
-              <a:buFontTx/>
-              <a:buNone/>
-              <a:tabLst/>
-              <a:defRPr/>
-            </a:pPr>
-            <a:r>
-              <a:rPr lang="de-DE" dirty="0" smtClean="0"/>
-              <a:t>BP </a:t>
-            </a:r>
-            <a:r>
-              <a:rPr lang="de-DE" dirty="0" err="1" smtClean="0"/>
-              <a:t>avoids</a:t>
-            </a:r>
-            <a:r>
-              <a:rPr lang="de-DE" baseline="0" dirty="0" smtClean="0"/>
-              <a:t> </a:t>
-            </a:r>
-            <a:r>
-              <a:rPr lang="de-DE" baseline="0" dirty="0" err="1" smtClean="0"/>
-              <a:t>assigning</a:t>
-            </a:r>
-            <a:r>
-              <a:rPr lang="de-DE" baseline="0" dirty="0" smtClean="0"/>
-              <a:t> a high </a:t>
-            </a:r>
-            <a:r>
-              <a:rPr lang="de-DE" baseline="0" dirty="0" err="1" smtClean="0"/>
-              <a:t>precision</a:t>
-            </a:r>
-            <a:r>
-              <a:rPr lang="de-DE" baseline="0" dirty="0" smtClean="0"/>
-              <a:t> </a:t>
-            </a:r>
-            <a:r>
-              <a:rPr lang="de-DE" baseline="0" dirty="0" err="1" smtClean="0"/>
-              <a:t>to</a:t>
-            </a:r>
-            <a:r>
-              <a:rPr lang="de-DE" baseline="0" dirty="0" smtClean="0"/>
-              <a:t> a </a:t>
-            </a:r>
-            <a:r>
-              <a:rPr lang="de-DE" baseline="0" dirty="0" err="1" smtClean="0"/>
-              <a:t>translations</a:t>
-            </a:r>
-            <a:r>
-              <a:rPr lang="de-DE" baseline="0" dirty="0" smtClean="0"/>
-              <a:t> </a:t>
-            </a:r>
-            <a:r>
-              <a:rPr lang="de-DE" baseline="0" dirty="0" err="1" smtClean="0"/>
-              <a:t>being</a:t>
-            </a:r>
-            <a:r>
-              <a:rPr lang="de-DE" baseline="0" dirty="0" smtClean="0"/>
-              <a:t> </a:t>
-            </a:r>
-            <a:r>
-              <a:rPr lang="de-DE" baseline="0" dirty="0" err="1" smtClean="0"/>
-              <a:t>to</a:t>
-            </a:r>
-            <a:r>
-              <a:rPr lang="de-DE" baseline="0" dirty="0" smtClean="0"/>
-              <a:t> </a:t>
-            </a:r>
-            <a:r>
-              <a:rPr lang="de-DE" baseline="0" dirty="0" err="1" smtClean="0"/>
-              <a:t>short</a:t>
-            </a:r>
-            <a:r>
-              <a:rPr lang="de-DE" baseline="0" dirty="0" smtClean="0"/>
-              <a:t>.</a:t>
-            </a:r>
             <a:endParaRPr lang="de-DE" dirty="0"/>
           </a:p>
         </p:txBody>
@@ -2214,198 +2043,6 @@
           <a:bodyPr/>
           <a:lstStyle/>
           <a:p>
-            <a:r>
-              <a:rPr lang="de-DE" dirty="0" smtClean="0"/>
-              <a:t>Precision</a:t>
-            </a:r>
-            <a:r>
-              <a:rPr lang="de-DE" baseline="0" dirty="0" smtClean="0"/>
-              <a:t> </a:t>
-            </a:r>
-            <a:r>
-              <a:rPr lang="de-DE" baseline="0" dirty="0" err="1" smtClean="0"/>
-              <a:t>and</a:t>
-            </a:r>
-            <a:r>
-              <a:rPr lang="de-DE" baseline="0" dirty="0" smtClean="0"/>
-              <a:t> </a:t>
-            </a:r>
-            <a:r>
-              <a:rPr lang="de-DE" baseline="0" dirty="0" err="1" smtClean="0"/>
-              <a:t>recall</a:t>
-            </a:r>
-            <a:r>
-              <a:rPr lang="de-DE" baseline="0" dirty="0" smtClean="0"/>
-              <a:t> on </a:t>
-            </a:r>
-            <a:r>
-              <a:rPr lang="de-DE" baseline="0" dirty="0" err="1" smtClean="0"/>
-              <a:t>unigram</a:t>
-            </a:r>
-            <a:r>
-              <a:rPr lang="de-DE" baseline="0" dirty="0" smtClean="0"/>
-              <a:t> </a:t>
-            </a:r>
-            <a:r>
-              <a:rPr lang="de-DE" baseline="0" dirty="0" err="1" smtClean="0"/>
-              <a:t>level</a:t>
-            </a:r>
-            <a:r>
-              <a:rPr lang="de-DE" baseline="0" dirty="0" smtClean="0"/>
-              <a:t> </a:t>
-            </a:r>
-            <a:r>
-              <a:rPr lang="de-DE" baseline="0" dirty="0" err="1" smtClean="0"/>
-              <a:t>by</a:t>
-            </a:r>
-            <a:r>
-              <a:rPr lang="de-DE" baseline="0" dirty="0" smtClean="0"/>
-              <a:t> </a:t>
-            </a:r>
-            <a:endParaRPr lang="de-DE" dirty="0" smtClean="0"/>
-          </a:p>
-          <a:p>
-            <a:r>
-              <a:rPr lang="de-DE" dirty="0" err="1" smtClean="0"/>
-              <a:t>Harmonic</a:t>
-            </a:r>
-            <a:r>
-              <a:rPr lang="de-DE" dirty="0" smtClean="0"/>
-              <a:t> </a:t>
-            </a:r>
-            <a:r>
-              <a:rPr lang="de-DE" dirty="0" err="1" smtClean="0"/>
-              <a:t>meand</a:t>
-            </a:r>
-            <a:r>
-              <a:rPr lang="de-DE" dirty="0" smtClean="0"/>
-              <a:t> </a:t>
-            </a:r>
-            <a:r>
-              <a:rPr lang="de-DE" dirty="0" err="1" smtClean="0"/>
-              <a:t>scaled</a:t>
-            </a:r>
-            <a:r>
-              <a:rPr lang="de-DE" dirty="0" smtClean="0"/>
-              <a:t> </a:t>
-            </a:r>
-            <a:r>
-              <a:rPr lang="de-DE" dirty="0" err="1" smtClean="0"/>
-              <a:t>by</a:t>
-            </a:r>
-            <a:r>
-              <a:rPr lang="de-DE" dirty="0" smtClean="0"/>
-              <a:t> </a:t>
-            </a:r>
-            <a:r>
-              <a:rPr lang="de-DE" dirty="0" err="1" smtClean="0"/>
-              <a:t>fragmentation</a:t>
-            </a:r>
-            <a:r>
-              <a:rPr lang="de-DE" dirty="0" smtClean="0"/>
-              <a:t> </a:t>
-            </a:r>
-            <a:r>
-              <a:rPr lang="de-DE" dirty="0" err="1" smtClean="0"/>
-              <a:t>penalty</a:t>
-            </a:r>
-            <a:endParaRPr lang="de-DE" dirty="0" smtClean="0"/>
-          </a:p>
-          <a:p>
-            <a:r>
-              <a:rPr lang="de-DE" dirty="0" err="1" smtClean="0"/>
-              <a:t>Fragmentation</a:t>
-            </a:r>
-            <a:r>
-              <a:rPr lang="de-DE" baseline="0" dirty="0" smtClean="0"/>
-              <a:t> </a:t>
-            </a:r>
-            <a:r>
-              <a:rPr lang="de-DE" baseline="0" dirty="0" err="1" smtClean="0"/>
-              <a:t>penalty</a:t>
-            </a:r>
-            <a:r>
-              <a:rPr lang="de-DE" baseline="0" dirty="0" smtClean="0"/>
-              <a:t> </a:t>
-            </a:r>
-            <a:r>
-              <a:rPr lang="de-DE" baseline="0" dirty="0" err="1" smtClean="0"/>
-              <a:t>penalizes</a:t>
-            </a:r>
-            <a:r>
-              <a:rPr lang="de-DE" baseline="0" dirty="0" smtClean="0"/>
-              <a:t> </a:t>
-            </a:r>
-            <a:r>
-              <a:rPr lang="de-DE" baseline="0" dirty="0" err="1" smtClean="0"/>
-              <a:t>gaps</a:t>
-            </a:r>
-            <a:r>
-              <a:rPr lang="de-DE" baseline="0" dirty="0" smtClean="0"/>
-              <a:t> </a:t>
-            </a:r>
-            <a:r>
-              <a:rPr lang="de-DE" baseline="0" dirty="0" err="1" smtClean="0"/>
-              <a:t>and</a:t>
-            </a:r>
-            <a:r>
-              <a:rPr lang="de-DE" baseline="0" dirty="0" smtClean="0"/>
-              <a:t> </a:t>
-            </a:r>
-            <a:r>
-              <a:rPr lang="de-DE" baseline="0" dirty="0" err="1" smtClean="0"/>
-              <a:t>differences</a:t>
-            </a:r>
-            <a:r>
-              <a:rPr lang="de-DE" baseline="0" dirty="0" smtClean="0"/>
-              <a:t> in </a:t>
-            </a:r>
-            <a:r>
-              <a:rPr lang="de-DE" baseline="0" dirty="0" err="1" smtClean="0"/>
-              <a:t>word</a:t>
-            </a:r>
-            <a:r>
-              <a:rPr lang="de-DE" baseline="0" dirty="0" smtClean="0"/>
-              <a:t> </a:t>
-            </a:r>
-            <a:r>
-              <a:rPr lang="de-DE" baseline="0" dirty="0" err="1" smtClean="0"/>
-              <a:t>order</a:t>
-            </a:r>
-            <a:r>
-              <a:rPr lang="de-DE" baseline="0" dirty="0" smtClean="0"/>
-              <a:t> (</a:t>
-            </a:r>
-            <a:r>
-              <a:rPr lang="de-DE" baseline="0" dirty="0" err="1" smtClean="0"/>
-              <a:t>accounts</a:t>
-            </a:r>
-            <a:r>
-              <a:rPr lang="de-DE" baseline="0" dirty="0" smtClean="0"/>
-              <a:t> </a:t>
-            </a:r>
-            <a:r>
-              <a:rPr lang="de-DE" baseline="0" dirty="0" err="1" smtClean="0"/>
-              <a:t>for</a:t>
-            </a:r>
-            <a:r>
-              <a:rPr lang="de-DE" baseline="0" dirty="0" smtClean="0"/>
-              <a:t> </a:t>
-            </a:r>
-            <a:r>
-              <a:rPr lang="de-DE" baseline="0" dirty="0" err="1" smtClean="0"/>
-              <a:t>fluency</a:t>
-            </a:r>
-            <a:r>
-              <a:rPr lang="de-DE" baseline="0" dirty="0" smtClean="0"/>
-              <a:t>)</a:t>
-            </a:r>
-          </a:p>
-          <a:p>
-            <a:r>
-              <a:rPr lang="en-US" dirty="0" smtClean="0"/>
-              <a:t>Alignments are based on exact, stem, synonym, and paraphrase matches between words and phrases</a:t>
-            </a:r>
             <a:endParaRPr lang="de-DE" dirty="0"/>
           </a:p>
         </p:txBody>
@@ -2491,314 +2128,6 @@
           <a:lstStyle/>
           <a:p>
             <a:r>
-              <a:rPr lang="de-DE" dirty="0" smtClean="0"/>
-              <a:t>NIST: </a:t>
-            </a:r>
-          </a:p>
-          <a:p>
-            <a:r>
-              <a:rPr lang="de-DE" dirty="0" smtClean="0"/>
-              <a:t>-</a:t>
-            </a:r>
-            <a:r>
-              <a:rPr lang="de-DE" dirty="0" err="1" smtClean="0"/>
-              <a:t>similar</a:t>
-            </a:r>
-            <a:r>
-              <a:rPr lang="de-DE" dirty="0" smtClean="0"/>
-              <a:t> </a:t>
-            </a:r>
-            <a:r>
-              <a:rPr lang="de-DE" dirty="0" err="1" smtClean="0"/>
-              <a:t>to</a:t>
-            </a:r>
-            <a:r>
-              <a:rPr lang="de-DE" dirty="0" smtClean="0"/>
-              <a:t> BLEU </a:t>
-            </a:r>
-            <a:r>
-              <a:rPr lang="de-DE" dirty="0" err="1" smtClean="0"/>
-              <a:t>by</a:t>
-            </a:r>
-            <a:r>
-              <a:rPr lang="de-DE" dirty="0" smtClean="0"/>
-              <a:t> </a:t>
-            </a:r>
-            <a:r>
-              <a:rPr lang="de-DE" dirty="0" err="1" smtClean="0"/>
-              <a:t>calculating</a:t>
-            </a:r>
-            <a:r>
-              <a:rPr lang="de-DE" dirty="0" smtClean="0"/>
-              <a:t> </a:t>
-            </a:r>
-            <a:r>
-              <a:rPr lang="de-DE" dirty="0" err="1" smtClean="0"/>
-              <a:t>the</a:t>
-            </a:r>
-            <a:r>
-              <a:rPr lang="de-DE" dirty="0" smtClean="0"/>
-              <a:t> n-gram </a:t>
-            </a:r>
-            <a:r>
-              <a:rPr lang="de-DE" dirty="0" err="1" smtClean="0"/>
-              <a:t>precision</a:t>
-            </a:r>
-            <a:endParaRPr lang="de-DE" dirty="0" smtClean="0"/>
-          </a:p>
-          <a:p>
-            <a:r>
-              <a:rPr lang="de-DE" baseline="0" dirty="0" smtClean="0"/>
-              <a:t>-but </a:t>
-            </a:r>
-            <a:r>
-              <a:rPr lang="de-DE" baseline="0" dirty="0" err="1" smtClean="0"/>
-              <a:t>combines</a:t>
-            </a:r>
-            <a:r>
-              <a:rPr lang="de-DE" baseline="0" dirty="0" smtClean="0"/>
-              <a:t> </a:t>
-            </a:r>
-            <a:r>
-              <a:rPr lang="de-DE" baseline="0" dirty="0" err="1" smtClean="0"/>
-              <a:t>usually</a:t>
-            </a:r>
-            <a:r>
-              <a:rPr lang="de-DE" baseline="0" dirty="0" smtClean="0"/>
-              <a:t> </a:t>
-            </a:r>
-            <a:r>
-              <a:rPr lang="de-DE" baseline="0" dirty="0" err="1" smtClean="0"/>
-              <a:t>for</a:t>
-            </a:r>
-            <a:r>
-              <a:rPr lang="de-DE" baseline="0" dirty="0" smtClean="0"/>
-              <a:t> N=5 </a:t>
-            </a:r>
-            <a:r>
-              <a:rPr lang="de-DE" baseline="0" dirty="0" err="1" smtClean="0"/>
-              <a:t>them</a:t>
-            </a:r>
-            <a:r>
-              <a:rPr lang="de-DE" baseline="0" dirty="0" smtClean="0"/>
-              <a:t> </a:t>
-            </a:r>
-            <a:r>
-              <a:rPr lang="de-DE" baseline="0" dirty="0" err="1" smtClean="0"/>
-              <a:t>into</a:t>
-            </a:r>
-            <a:r>
-              <a:rPr lang="de-DE" baseline="0" dirty="0" smtClean="0"/>
-              <a:t> </a:t>
-            </a:r>
-            <a:r>
-              <a:rPr lang="de-DE" baseline="0" dirty="0" err="1" smtClean="0"/>
-              <a:t>the</a:t>
-            </a:r>
-            <a:r>
-              <a:rPr lang="de-DE" baseline="0" dirty="0" smtClean="0"/>
-              <a:t> </a:t>
-            </a:r>
-            <a:r>
-              <a:rPr lang="de-DE" baseline="0" dirty="0" err="1" smtClean="0"/>
-              <a:t>arithmetic</a:t>
-            </a:r>
-            <a:r>
-              <a:rPr lang="de-DE" baseline="0" dirty="0" smtClean="0"/>
-              <a:t> </a:t>
-            </a:r>
-            <a:r>
-              <a:rPr lang="de-DE" baseline="0" dirty="0" err="1" smtClean="0"/>
-              <a:t>mean</a:t>
-            </a:r>
-            <a:r>
-              <a:rPr lang="de-DE" baseline="0" dirty="0" smtClean="0"/>
-              <a:t> </a:t>
-            </a:r>
-            <a:r>
-              <a:rPr lang="de-DE" baseline="0" dirty="0" err="1" smtClean="0"/>
-              <a:t>scaled</a:t>
-            </a:r>
-            <a:r>
-              <a:rPr lang="de-DE" baseline="0" dirty="0" smtClean="0"/>
-              <a:t> </a:t>
-            </a:r>
-            <a:r>
-              <a:rPr lang="de-DE" baseline="0" dirty="0" err="1" smtClean="0"/>
-              <a:t>by</a:t>
-            </a:r>
-            <a:r>
-              <a:rPr lang="de-DE" baseline="0" dirty="0" smtClean="0"/>
-              <a:t> a </a:t>
-            </a:r>
-            <a:r>
-              <a:rPr lang="de-DE" baseline="0" dirty="0" err="1" smtClean="0"/>
-              <a:t>differnt</a:t>
-            </a:r>
-            <a:r>
-              <a:rPr lang="de-DE" baseline="0" dirty="0" smtClean="0"/>
-              <a:t> BP</a:t>
-            </a:r>
-          </a:p>
-          <a:p>
-            <a:r>
-              <a:rPr lang="de-DE" baseline="0" dirty="0" smtClean="0"/>
-              <a:t>-</a:t>
-            </a:r>
-            <a:r>
-              <a:rPr lang="de-DE" baseline="0" dirty="0" err="1" smtClean="0"/>
-              <a:t>considers</a:t>
-            </a:r>
-            <a:r>
-              <a:rPr lang="de-DE" baseline="0" dirty="0" smtClean="0"/>
-              <a:t> </a:t>
-            </a:r>
-            <a:r>
-              <a:rPr lang="de-DE" baseline="0" dirty="0" err="1" smtClean="0"/>
-              <a:t>information</a:t>
-            </a:r>
-            <a:r>
-              <a:rPr lang="de-DE" baseline="0" dirty="0" smtClean="0"/>
-              <a:t> </a:t>
-            </a:r>
-            <a:r>
-              <a:rPr lang="de-DE" baseline="0" dirty="0" err="1" smtClean="0"/>
-              <a:t>gain</a:t>
-            </a:r>
-            <a:r>
-              <a:rPr lang="de-DE" baseline="0" dirty="0" smtClean="0"/>
-              <a:t>, </a:t>
-            </a:r>
-            <a:r>
-              <a:rPr lang="de-DE" baseline="0" dirty="0" err="1" smtClean="0"/>
-              <a:t>meaning</a:t>
-            </a:r>
-            <a:r>
-              <a:rPr lang="de-DE" baseline="0" dirty="0" smtClean="0"/>
-              <a:t> </a:t>
-            </a:r>
-            <a:r>
-              <a:rPr lang="de-DE" baseline="0" dirty="0" err="1" smtClean="0"/>
-              <a:t>that</a:t>
-            </a:r>
-            <a:r>
-              <a:rPr lang="de-DE" baseline="0" dirty="0" smtClean="0"/>
-              <a:t> </a:t>
-            </a:r>
-            <a:r>
-              <a:rPr lang="de-DE" baseline="0" dirty="0" err="1" smtClean="0"/>
-              <a:t>less</a:t>
-            </a:r>
-            <a:r>
-              <a:rPr lang="de-DE" baseline="0" dirty="0" smtClean="0"/>
-              <a:t> </a:t>
-            </a:r>
-            <a:r>
-              <a:rPr lang="de-DE" baseline="0" dirty="0" err="1" smtClean="0"/>
-              <a:t>frequent</a:t>
-            </a:r>
-            <a:r>
-              <a:rPr lang="de-DE" baseline="0" dirty="0" smtClean="0"/>
-              <a:t> n-grams </a:t>
-            </a:r>
-            <a:r>
-              <a:rPr lang="de-DE" baseline="0" dirty="0" err="1" smtClean="0"/>
-              <a:t>are</a:t>
-            </a:r>
-            <a:r>
-              <a:rPr lang="de-DE" baseline="0" dirty="0" smtClean="0"/>
-              <a:t> </a:t>
-            </a:r>
-            <a:r>
-              <a:rPr lang="de-DE" baseline="0" dirty="0" err="1" smtClean="0"/>
-              <a:t>weighted</a:t>
-            </a:r>
-            <a:r>
-              <a:rPr lang="de-DE" baseline="0" dirty="0" smtClean="0"/>
-              <a:t> </a:t>
-            </a:r>
-            <a:r>
-              <a:rPr lang="de-DE" baseline="0" dirty="0" err="1" smtClean="0"/>
-              <a:t>more</a:t>
-            </a:r>
-            <a:r>
-              <a:rPr lang="de-DE" baseline="0" dirty="0" smtClean="0"/>
-              <a:t> </a:t>
-            </a:r>
-            <a:r>
-              <a:rPr lang="de-DE" baseline="0" dirty="0" err="1" smtClean="0"/>
-              <a:t>heavily</a:t>
-            </a:r>
-            <a:endParaRPr lang="de-DE" baseline="0" dirty="0" smtClean="0"/>
-          </a:p>
-          <a:p>
-            <a:endParaRPr lang="de-DE" baseline="0" dirty="0" smtClean="0"/>
-          </a:p>
-          <a:p>
-            <a:r>
-              <a:rPr lang="de-DE" baseline="0" dirty="0" err="1" smtClean="0"/>
-              <a:t>Translatrion</a:t>
-            </a:r>
-            <a:r>
-              <a:rPr lang="de-DE" baseline="0" dirty="0" smtClean="0"/>
-              <a:t> </a:t>
-            </a:r>
-            <a:r>
-              <a:rPr lang="de-DE" baseline="0" dirty="0" err="1" smtClean="0"/>
-              <a:t>edit</a:t>
-            </a:r>
-            <a:r>
-              <a:rPr lang="de-DE" baseline="0" dirty="0" smtClean="0"/>
-              <a:t> rate </a:t>
-            </a:r>
-            <a:r>
-              <a:rPr lang="de-DE" baseline="0" dirty="0" err="1" smtClean="0"/>
-              <a:t>TERp</a:t>
-            </a:r>
-            <a:r>
-              <a:rPr lang="de-DE" baseline="0" dirty="0" smtClean="0"/>
-              <a:t>: </a:t>
-            </a:r>
-            <a:r>
-              <a:rPr lang="de-DE" baseline="0" dirty="0" err="1" smtClean="0"/>
-              <a:t>uses</a:t>
-            </a:r>
-            <a:r>
-              <a:rPr lang="de-DE" baseline="0" dirty="0" smtClean="0"/>
-              <a:t> </a:t>
-            </a:r>
-            <a:r>
-              <a:rPr lang="de-DE" baseline="0" dirty="0" err="1" smtClean="0"/>
-              <a:t>stemming</a:t>
-            </a:r>
-            <a:r>
-              <a:rPr lang="de-DE" baseline="0" dirty="0" smtClean="0"/>
-              <a:t>, </a:t>
-            </a:r>
-            <a:r>
-              <a:rPr lang="de-DE" baseline="0" dirty="0" err="1" smtClean="0"/>
-              <a:t>synonyms</a:t>
-            </a:r>
-            <a:r>
-              <a:rPr lang="de-DE" baseline="0" dirty="0" smtClean="0"/>
-              <a:t> </a:t>
-            </a:r>
-            <a:r>
-              <a:rPr lang="de-DE" baseline="0" dirty="0" err="1" smtClean="0"/>
-              <a:t>and</a:t>
-            </a:r>
-            <a:r>
-              <a:rPr lang="de-DE" baseline="0" dirty="0" smtClean="0"/>
-              <a:t> </a:t>
-            </a:r>
-            <a:r>
-              <a:rPr lang="de-DE" baseline="0" dirty="0" err="1" smtClean="0"/>
-              <a:t>paraphrases</a:t>
-            </a:r>
-            <a:endParaRPr lang="de-DE" baseline="0" dirty="0" smtClean="0"/>
-          </a:p>
-          <a:p>
-            <a:r>
               <a:rPr lang="de-DE" baseline="0" dirty="0" smtClean="0"/>
               <a:t>	</a:t>
             </a:r>
@@ -2886,161 +2215,6 @@
           <a:bodyPr/>
           <a:lstStyle/>
           <a:p>
-            <a:r>
-              <a:rPr lang="en-US" sz="1200" kern="1200" dirty="0" smtClean="0">
-                <a:solidFill>
-                  <a:schemeClr val="tx1"/>
-                </a:solidFill>
-                <a:effectLst/>
-                <a:latin typeface="+mn-lt"/>
-                <a:ea typeface="+mn-ea"/>
-                <a:cs typeface="+mn-cs"/>
-              </a:rPr>
-              <a:t>HMEANT: Verb frames and their role fillers are manually annotated and alignment with the hypothesis translation, f-score from the counts </a:t>
-            </a:r>
-            <a:r>
-              <a:rPr lang="de-DE" sz="1200" b="0" i="0" u="none" strike="noStrike" kern="1200" baseline="0" dirty="0" err="1" smtClean="0">
-                <a:solidFill>
-                  <a:schemeClr val="tx1"/>
-                </a:solidFill>
-                <a:latin typeface="+mn-lt"/>
-                <a:ea typeface="+mn-ea"/>
-                <a:cs typeface="+mn-cs"/>
-              </a:rPr>
-              <a:t>of</a:t>
-            </a:r>
-            <a:r>
-              <a:rPr lang="de-DE" sz="1200" b="0" i="0" u="none" strike="noStrike" kern="1200" baseline="0" dirty="0" smtClean="0">
-                <a:solidFill>
-                  <a:schemeClr val="tx1"/>
-                </a:solidFill>
-                <a:latin typeface="+mn-lt"/>
-                <a:ea typeface="+mn-ea"/>
-                <a:cs typeface="+mn-cs"/>
-              </a:rPr>
-              <a:t> </a:t>
-            </a:r>
-            <a:r>
-              <a:rPr lang="en-US" sz="1200" b="0" i="0" u="none" strike="noStrike" kern="1200" baseline="0" dirty="0" smtClean="0">
-                <a:solidFill>
-                  <a:schemeClr val="tx1"/>
-                </a:solidFill>
-                <a:latin typeface="+mn-lt"/>
-                <a:ea typeface="+mn-ea"/>
-                <a:cs typeface="+mn-cs"/>
-              </a:rPr>
-              <a:t>matches of frames and their role fillers between the reference and the MT </a:t>
-            </a:r>
-            <a:r>
-              <a:rPr lang="en-US" sz="1200" b="0" i="0" u="none" strike="noStrike" kern="1200" baseline="0" err="1" smtClean="0">
-                <a:solidFill>
-                  <a:schemeClr val="tx1"/>
-                </a:solidFill>
-                <a:latin typeface="+mn-lt"/>
-                <a:ea typeface="+mn-ea"/>
-                <a:cs typeface="+mn-cs"/>
-              </a:rPr>
-              <a:t>output</a:t>
-            </a:r>
-            <a:r>
-              <a:rPr lang="en-US" sz="1200" b="0" i="0" u="none" strike="noStrike" kern="1200" baseline="0" smtClean="0">
-                <a:solidFill>
-                  <a:schemeClr val="tx1"/>
-                </a:solidFill>
-                <a:latin typeface="+mn-lt"/>
-                <a:ea typeface="+mn-ea"/>
-                <a:cs typeface="+mn-cs"/>
-              </a:rPr>
-              <a:t>.</a:t>
-            </a:r>
-          </a:p>
-          <a:p>
-            <a:r>
-              <a:rPr lang="en-US" sz="1200" kern="1200" smtClean="0">
-                <a:solidFill>
-                  <a:schemeClr val="tx1"/>
-                </a:solidFill>
-                <a:effectLst/>
-                <a:latin typeface="+mn-lt"/>
-                <a:ea typeface="+mn-ea"/>
-                <a:cs typeface="+mn-cs"/>
-              </a:rPr>
-              <a:t>Adequacy/Fluency </a:t>
-            </a:r>
-            <a:r>
-              <a:rPr lang="en-US" sz="1200" kern="1200" dirty="0" smtClean="0">
-                <a:solidFill>
-                  <a:schemeClr val="tx1"/>
-                </a:solidFill>
-                <a:effectLst/>
-                <a:latin typeface="+mn-lt"/>
-                <a:ea typeface="+mn-ea"/>
-                <a:cs typeface="+mn-cs"/>
-              </a:rPr>
-              <a:t>(1 to 5 scale)</a:t>
-            </a:r>
-          </a:p>
-          <a:p>
-            <a:pPr rtl="0"/>
-            <a:r>
-              <a:rPr lang="en-US" sz="1200" kern="1200" dirty="0" smtClean="0">
-                <a:solidFill>
-                  <a:schemeClr val="tx1"/>
-                </a:solidFill>
-                <a:effectLst/>
-                <a:latin typeface="+mn-lt"/>
-                <a:ea typeface="+mn-ea"/>
-                <a:cs typeface="+mn-cs"/>
-              </a:rPr>
-              <a:t>Ranking (best to worst)</a:t>
-            </a:r>
-          </a:p>
-          <a:p>
-            <a:pPr rtl="0"/>
-            <a:r>
-              <a:rPr lang="en-US" sz="1200" kern="1200" dirty="0" smtClean="0">
-                <a:solidFill>
-                  <a:schemeClr val="tx1"/>
-                </a:solidFill>
-                <a:effectLst/>
-                <a:latin typeface="+mn-lt"/>
-                <a:ea typeface="+mn-ea"/>
-                <a:cs typeface="+mn-cs"/>
-              </a:rPr>
-              <a:t>Yes/no assessments (acceptable translation?)</a:t>
-            </a:r>
-          </a:p>
-          <a:p>
-            <a:pPr rtl="0"/>
-            <a:r>
-              <a:rPr lang="en-US" sz="1200" kern="1200" dirty="0" smtClean="0">
-                <a:solidFill>
-                  <a:schemeClr val="tx1"/>
-                </a:solidFill>
-                <a:effectLst/>
-                <a:latin typeface="+mn-lt"/>
-                <a:ea typeface="+mn-ea"/>
-                <a:cs typeface="+mn-cs"/>
-              </a:rPr>
-              <a:t>Human post-editing time</a:t>
-            </a:r>
-          </a:p>
-          <a:p>
-            <a:pPr rtl="0"/>
-            <a:r>
-              <a:rPr lang="en-US" sz="1200" kern="1200" dirty="0" smtClean="0">
-                <a:solidFill>
-                  <a:schemeClr val="tx1"/>
-                </a:solidFill>
-                <a:effectLst/>
-                <a:latin typeface="+mn-lt"/>
-                <a:ea typeface="+mn-ea"/>
-                <a:cs typeface="+mn-cs"/>
-              </a:rPr>
-              <a:t>Usability (Good, useful, useless)</a:t>
-            </a:r>
-          </a:p>
-          <a:p>
             <a:endParaRPr lang="de-DE" dirty="0"/>
           </a:p>
         </p:txBody>
@@ -3125,99 +2299,6 @@
           <a:bodyPr/>
           <a:lstStyle/>
           <a:p>
-            <a:r>
-              <a:rPr lang="de-DE" dirty="0" err="1" smtClean="0"/>
-              <a:t>Documentarische</a:t>
-            </a:r>
-            <a:r>
-              <a:rPr lang="de-DE" dirty="0" smtClean="0"/>
-              <a:t> Ü</a:t>
-            </a:r>
-            <a:r>
-              <a:rPr lang="de-DE" dirty="0" smtClean="0">
-                <a:sym typeface="Wingdings" panose="05000000000000000000" pitchFamily="2" charset="2"/>
-              </a:rPr>
-              <a:t> soll darstellen wie der AT aussieht (Stil, Form, Inhalt reproduzieren) Leser des ZT</a:t>
-            </a:r>
-          </a:p>
-          <a:p>
-            <a:r>
-              <a:rPr lang="de-DE" dirty="0" err="1" smtClean="0">
-                <a:sym typeface="Wingdings" panose="05000000000000000000" pitchFamily="2" charset="2"/>
-              </a:rPr>
-              <a:t>Instr</a:t>
-            </a:r>
-            <a:r>
-              <a:rPr lang="de-DE" dirty="0" smtClean="0">
-                <a:sym typeface="Wingdings" panose="05000000000000000000" pitchFamily="2" charset="2"/>
-              </a:rPr>
-              <a:t> Ü (covert) Ü  unabhängig</a:t>
-            </a:r>
-            <a:r>
-              <a:rPr lang="de-DE" baseline="0" dirty="0" smtClean="0">
-                <a:sym typeface="Wingdings" panose="05000000000000000000" pitchFamily="2" charset="2"/>
-              </a:rPr>
-              <a:t> vom AT, Text soll nicht nach Ü </a:t>
-            </a:r>
-            <a:r>
-              <a:rPr lang="de-DE" baseline="0" dirty="0" err="1" smtClean="0">
-                <a:sym typeface="Wingdings" panose="05000000000000000000" pitchFamily="2" charset="2"/>
-              </a:rPr>
-              <a:t>aussuehen</a:t>
-            </a:r>
-            <a:endParaRPr lang="de-DE" baseline="0" dirty="0" smtClean="0">
-              <a:sym typeface="Wingdings" panose="05000000000000000000" pitchFamily="2" charset="2"/>
-            </a:endParaRPr>
-          </a:p>
-          <a:p>
-            <a:r>
-              <a:rPr lang="de-DE" baseline="0" dirty="0" smtClean="0">
-                <a:sym typeface="Wingdings" panose="05000000000000000000" pitchFamily="2" charset="2"/>
-              </a:rPr>
-              <a:t>Doc. Vs. </a:t>
-            </a:r>
-            <a:r>
-              <a:rPr lang="de-DE" baseline="0" dirty="0" err="1" smtClean="0">
-                <a:sym typeface="Wingdings" panose="05000000000000000000" pitchFamily="2" charset="2"/>
-              </a:rPr>
-              <a:t>Instr</a:t>
-            </a:r>
-            <a:r>
-              <a:rPr lang="de-DE" baseline="0" dirty="0" smtClean="0">
-                <a:sym typeface="Wingdings" panose="05000000000000000000" pitchFamily="2" charset="2"/>
-              </a:rPr>
-              <a:t>.  </a:t>
-            </a:r>
-            <a:r>
-              <a:rPr lang="de-DE" baseline="0" dirty="0" err="1" smtClean="0">
-                <a:sym typeface="Wingdings" panose="05000000000000000000" pitchFamily="2" charset="2"/>
-              </a:rPr>
-              <a:t>Function</a:t>
-            </a:r>
-            <a:r>
-              <a:rPr lang="de-DE" baseline="0" dirty="0" smtClean="0">
-                <a:sym typeface="Wingdings" panose="05000000000000000000" pitchFamily="2" charset="2"/>
-              </a:rPr>
-              <a:t> </a:t>
-            </a:r>
-            <a:r>
-              <a:rPr lang="de-DE" baseline="0" dirty="0" err="1" smtClean="0">
-                <a:sym typeface="Wingdings" panose="05000000000000000000" pitchFamily="2" charset="2"/>
-              </a:rPr>
-              <a:t>of</a:t>
-            </a:r>
-            <a:r>
-              <a:rPr lang="de-DE" baseline="0" dirty="0" smtClean="0">
-                <a:sym typeface="Wingdings" panose="05000000000000000000" pitchFamily="2" charset="2"/>
-              </a:rPr>
-              <a:t> </a:t>
-            </a:r>
-            <a:r>
-              <a:rPr lang="de-DE" baseline="0" dirty="0" err="1" smtClean="0">
-                <a:sym typeface="Wingdings" panose="05000000000000000000" pitchFamily="2" charset="2"/>
-              </a:rPr>
-              <a:t>translation</a:t>
-            </a:r>
             <a:endParaRPr lang="de-DE" dirty="0"/>
           </a:p>
         </p:txBody>
@@ -3302,26 +2383,6 @@
           <a:bodyPr/>
           <a:lstStyle/>
           <a:p>
-            <a:r>
-              <a:rPr lang="en-US" dirty="0" err="1" smtClean="0"/>
-              <a:t>Skopos</a:t>
-            </a:r>
-            <a:r>
-              <a:rPr lang="en-US" dirty="0" smtClean="0"/>
-              <a:t> theory focuses on translation as an activity with an aim or purpose, and on the intended addressee or audience of the translation. To translate means to produce a target text in a target setting for a target purpose and target addressees in target circumstances. In </a:t>
-            </a:r>
-            <a:r>
-              <a:rPr lang="en-US" dirty="0" err="1" smtClean="0"/>
-              <a:t>skopos</a:t>
-            </a:r>
-            <a:r>
-              <a:rPr lang="en-US" dirty="0" smtClean="0"/>
-              <a:t> theory, the status of the source text is lower than it is in equivalence-based theories of translation. The source text</a:t>
-            </a:r>
-            <a:r>
-              <a:rPr lang="en-US" baseline="0" dirty="0" smtClean="0"/>
-              <a:t> is a basis for the production of a text in a target language with a certain function. </a:t>
-            </a:r>
             <a:endParaRPr lang="de-DE" dirty="0"/>
           </a:p>
         </p:txBody>
@@ -3406,62 +2467,6 @@
           <a:bodyPr/>
           <a:lstStyle/>
           <a:p>
-            <a:r>
-              <a:rPr lang="de-DE" dirty="0" smtClean="0"/>
-              <a:t>Errors -&gt;</a:t>
-            </a:r>
-            <a:r>
-              <a:rPr lang="de-DE" baseline="0" dirty="0" smtClean="0"/>
-              <a:t> </a:t>
-            </a:r>
-            <a:r>
-              <a:rPr lang="de-DE" baseline="0" dirty="0" err="1" smtClean="0"/>
-              <a:t>mt</a:t>
-            </a:r>
-            <a:r>
-              <a:rPr lang="de-DE" baseline="0" dirty="0" smtClean="0"/>
-              <a:t> </a:t>
-            </a:r>
-            <a:r>
-              <a:rPr lang="de-DE" baseline="0" dirty="0" err="1" smtClean="0"/>
-              <a:t>evaluation</a:t>
-            </a:r>
-            <a:r>
-              <a:rPr lang="de-DE" baseline="0" dirty="0" smtClean="0"/>
-              <a:t> </a:t>
-            </a:r>
-            <a:r>
-              <a:rPr lang="de-DE" baseline="0" dirty="0" err="1" smtClean="0"/>
-              <a:t>metrics</a:t>
-            </a:r>
-            <a:r>
-              <a:rPr lang="de-DE" baseline="0" dirty="0" smtClean="0"/>
-              <a:t> nicht in Betracht gezogen von MÜ</a:t>
-            </a:r>
-          </a:p>
-          <a:p>
-            <a:r>
-              <a:rPr lang="de-DE" baseline="0" dirty="0" err="1" smtClean="0"/>
-              <a:t>Pragmatic</a:t>
-            </a:r>
-            <a:r>
-              <a:rPr lang="de-DE" baseline="0" dirty="0" smtClean="0"/>
-              <a:t> </a:t>
-            </a:r>
-            <a:r>
-              <a:rPr lang="de-DE" baseline="0" dirty="0" err="1" smtClean="0"/>
-              <a:t>error</a:t>
-            </a:r>
-            <a:r>
-              <a:rPr lang="de-DE" baseline="0" dirty="0" smtClean="0"/>
-              <a:t> </a:t>
-            </a:r>
-            <a:r>
-              <a:rPr lang="de-DE" baseline="0" dirty="0" smtClean="0">
-                <a:sym typeface="Wingdings" panose="05000000000000000000" pitchFamily="2" charset="2"/>
-              </a:rPr>
-              <a:t> alles was die beteiligten Personen mit dem Text verbindet</a:t>
-            </a:r>
             <a:endParaRPr lang="de-DE" dirty="0"/>
           </a:p>
         </p:txBody>
@@ -3793,7 +2798,7 @@
           <a:p>
             <a:fld id="{DA1B50B5-D682-402A-BEC0-99BD71D08173}" type="datetime1">
               <a:rPr lang="de-DE" smtClean="0"/>
-              <a:t>26.05.2014</a:t>
+              <a:t>28.05.2014</a:t>
             </a:fld>
             <a:endParaRPr lang="de-DE"/>
           </a:p>
@@ -3988,7 +2993,7 @@
           <a:p>
             <a:fld id="{D4C83459-F00B-416E-9C88-08D2C460DD93}" type="datetime1">
               <a:rPr lang="de-DE" smtClean="0"/>
-              <a:t>26.05.2014</a:t>
+              <a:t>28.05.2014</a:t>
             </a:fld>
             <a:endParaRPr lang="de-DE"/>
           </a:p>
@@ -4177,7 +3182,7 @@
           <a:p>
             <a:fld id="{1E07413A-991C-4111-9214-ACD9F13E08EF}" type="datetime1">
               <a:rPr lang="de-DE" smtClean="0"/>
-              <a:t>26.05.2014</a:t>
+              <a:t>28.05.2014</a:t>
             </a:fld>
             <a:endParaRPr lang="de-DE"/>
           </a:p>
@@ -4444,7 +3449,7 @@
           <a:p>
             <a:fld id="{F4B76305-BBD0-4F82-8092-408659DD46D8}" type="datetime1">
               <a:rPr lang="de-DE" smtClean="0"/>
-              <a:t>26.05.2014</a:t>
+              <a:t>28.05.2014</a:t>
             </a:fld>
             <a:endParaRPr lang="de-DE"/>
           </a:p>
@@ -4864,7 +3869,7 @@
           <a:p>
             <a:fld id="{A7DDECB2-3084-4B66-8342-2E3EF9D78935}" type="datetime1">
               <a:rPr lang="de-DE" smtClean="0"/>
-              <a:t>26.05.2014</a:t>
+              <a:t>28.05.2014</a:t>
             </a:fld>
             <a:endParaRPr lang="de-DE"/>
           </a:p>
@@ -5110,7 +4115,7 @@
           <a:p>
             <a:fld id="{DDB9BC4C-6FD9-4D3A-8944-9C362AB5D954}" type="datetime1">
               <a:rPr lang="de-DE" smtClean="0"/>
-              <a:t>26.05.2014</a:t>
+              <a:t>28.05.2014</a:t>
             </a:fld>
             <a:endParaRPr lang="de-DE"/>
           </a:p>
@@ -5350,7 +4355,7 @@
           <a:p>
             <a:fld id="{2BEA8E3A-05A2-4C31-9118-7D376A8AAC7B}" type="datetime1">
               <a:rPr lang="de-DE" smtClean="0"/>
-              <a:t>26.05.2014</a:t>
+              <a:t>28.05.2014</a:t>
             </a:fld>
             <a:endParaRPr lang="de-DE"/>
           </a:p>
@@ -5549,7 +4554,7 @@
           <a:p>
             <a:fld id="{7C78F27C-2EB7-4FFA-B347-84BBCEF775FE}" type="datetime1">
               <a:rPr lang="de-DE" smtClean="0"/>
-              <a:t>26.05.2014</a:t>
+              <a:t>28.05.2014</a:t>
             </a:fld>
             <a:endParaRPr lang="de-DE"/>
           </a:p>
@@ -5651,7 +4656,7 @@
           <a:p>
             <a:fld id="{6FFE883F-7B7E-4D6C-9E9F-EA4E2C053B8F}" type="datetime1">
               <a:rPr lang="de-DE" smtClean="0"/>
-              <a:t>26.05.2014</a:t>
+              <a:t>28.05.2014</a:t>
             </a:fld>
             <a:endParaRPr lang="de-DE"/>
           </a:p>
@@ -5791,7 +4796,7 @@
           <a:p>
             <a:fld id="{01A59BEF-7917-4920-ACD0-4B545B792F4B}" type="datetime1">
               <a:rPr lang="de-DE" smtClean="0"/>
-              <a:t>26.05.2014</a:t>
+              <a:t>28.05.2014</a:t>
             </a:fld>
             <a:endParaRPr lang="de-DE"/>
           </a:p>
@@ -6313,7 +5318,7 @@
           <a:p>
             <a:fld id="{5763C895-168A-4320-8B99-3C8F6F181309}" type="datetime1">
               <a:rPr lang="de-DE" smtClean="0"/>
-              <a:t>26.05.2014</a:t>
+              <a:t>28.05.2014</a:t>
             </a:fld>
             <a:endParaRPr lang="de-DE"/>
           </a:p>
@@ -6578,7 +5583,7 @@
           <a:p>
             <a:fld id="{0BD3672B-D473-4523-8A8B-320BB605B606}" type="datetime1">
               <a:rPr lang="de-DE" smtClean="0"/>
-              <a:t>26.05.2014</a:t>
+              <a:t>28.05.2014</a:t>
             </a:fld>
             <a:endParaRPr lang="de-DE"/>
           </a:p>
@@ -7170,7 +6175,15 @@
             </a:r>
             <a:r>
               <a:rPr lang="de-DE" dirty="0" smtClean="0"/>
-              <a:t> ist </a:t>
+              <a:t> </a:t>
+            </a:r>
+            <a:r>
+              <a:rPr lang="de-DE" dirty="0" err="1" smtClean="0"/>
+              <a:t>itS</a:t>
+            </a:r>
+            <a:r>
+              <a:rPr lang="de-DE" dirty="0" smtClean="0"/>
+              <a:t> </a:t>
             </a:r>
             <a:r>
               <a:rPr lang="de-DE" dirty="0" err="1" smtClean="0"/>
@@ -7438,7 +6451,7 @@
           <a:p>
             <a:fld id="{4CE24DAC-D5E7-4831-B41C-A4541A26EFA3}" type="datetime1">
               <a:rPr lang="de-DE" smtClean="0"/>
-              <a:t>26.05.2014</a:t>
+              <a:t>28.05.2014</a:t>
             </a:fld>
             <a:endParaRPr lang="de-DE"/>
           </a:p>
@@ -7791,7 +6804,7 @@
           <a:p>
             <a:fld id="{DD6F6FB4-9528-4F76-8107-92CB0CBC0BAA}" type="datetime1">
               <a:rPr lang="de-DE" smtClean="0"/>
-              <a:t>26.05.2014</a:t>
+              <a:t>28.05.2014</a:t>
             </a:fld>
             <a:endParaRPr lang="de-DE"/>
           </a:p>
@@ -8298,7 +7311,7 @@
           <a:p>
             <a:fld id="{83EC6124-55D8-4AB5-B23F-73AB228EA834}" type="datetime1">
               <a:rPr lang="de-DE" smtClean="0"/>
-              <a:t>26.05.2014</a:t>
+              <a:t>28.05.2014</a:t>
             </a:fld>
             <a:endParaRPr lang="de-DE"/>
           </a:p>
@@ -8965,11 +7978,11 @@
   <p:clrMapOvr>
     <a:masterClrMapping/>
   </p:clrMapOvr>
-  <mc:AlternateContent xmlns:mc="http://schemas.openxmlformats.org/markup-compatibility/2006">
-    <mc:Choice xmlns:p14="http://schemas.microsoft.com/office/powerpoint/2010/main" Requires="p14">
+  <mc:AlternateContent xmlns:mc="http://schemas.openxmlformats.org/markup-compatibility/2006" xmlns:p14="http://schemas.microsoft.com/office/powerpoint/2010/main">
+    <mc:Choice Requires="p14">
       <p:transition spd="slow" p14:dur="2000"/>
     </mc:Choice>
-    <mc:Fallback>
+    <mc:Fallback xmlns="">
       <p:transition spd="slow"/>
     </mc:Fallback>
   </mc:AlternateContent>
@@ -9044,7 +8057,7 @@
           <a:p>
             <a:fld id="{302FEA6C-4249-4182-BBE4-50221D6418F8}" type="datetime1">
               <a:rPr lang="de-DE" smtClean="0"/>
-              <a:t>26.05.2014</a:t>
+              <a:t>28.05.2014</a:t>
             </a:fld>
             <a:endParaRPr lang="de-DE"/>
           </a:p>
@@ -9349,7 +8362,7 @@
             </a:r>
             <a:r>
               <a:rPr lang="de-DE" dirty="0" err="1" smtClean="0"/>
-              <a:t>correlatin</a:t>
+              <a:t>correlation</a:t>
             </a:r>
             <a:r>
               <a:rPr lang="de-DE" dirty="0" smtClean="0"/>
@@ -9462,7 +8475,7 @@
           <a:p>
             <a:fld id="{F0C67C79-2B48-474C-9EF9-34C2D66C7B3B}" type="datetime1">
               <a:rPr lang="de-DE" smtClean="0"/>
-              <a:t>26.05.2014</a:t>
+              <a:t>28.05.2014</a:t>
             </a:fld>
             <a:endParaRPr lang="de-DE"/>
           </a:p>
@@ -9956,7 +8969,7 @@
           <a:p>
             <a:fld id="{4A34103E-487D-4B86-BF17-28EF8D933D94}" type="datetime1">
               <a:rPr lang="de-DE" smtClean="0"/>
-              <a:t>26.05.2014</a:t>
+              <a:t>28.05.2014</a:t>
             </a:fld>
             <a:endParaRPr lang="de-DE"/>
           </a:p>
@@ -10441,7 +9454,7 @@
           <a:p>
             <a:fld id="{4F635B06-B32E-42C1-847B-2804E2495E93}" type="datetime1">
               <a:rPr lang="de-DE" smtClean="0"/>
-              <a:t>26.05.2014</a:t>
+              <a:t>28.05.2014</a:t>
             </a:fld>
             <a:endParaRPr lang="de-DE"/>
           </a:p>
@@ -10944,7 +9957,7 @@
           <a:p>
             <a:fld id="{0648CB26-11C6-4008-8246-EA023F7FE42D}" type="datetime1">
               <a:rPr lang="de-DE" smtClean="0"/>
-              <a:t>26.05.2014</a:t>
+              <a:t>28.05.2014</a:t>
             </a:fld>
             <a:endParaRPr lang="de-DE"/>
           </a:p>
@@ -12985,7 +11998,7 @@
           <a:p>
             <a:fld id="{F4B76305-BBD0-4F82-8092-408659DD46D8}" type="datetime1">
               <a:rPr lang="de-DE" smtClean="0"/>
-              <a:t>26.05.2014</a:t>
+              <a:t>28.05.2014</a:t>
             </a:fld>
             <a:endParaRPr lang="de-DE"/>
           </a:p>
@@ -13342,7 +12355,7 @@
           <a:p>
             <a:fld id="{0648CB26-11C6-4008-8246-EA023F7FE42D}" type="datetime1">
               <a:rPr lang="de-DE" smtClean="0"/>
-              <a:t>26.05.2014</a:t>
+              <a:t>28.05.2014</a:t>
             </a:fld>
             <a:endParaRPr lang="de-DE"/>
           </a:p>
@@ -13406,7 +12419,7 @@
             <p:ph sz="quarter" idx="1"/>
             <p:extLst>
               <p:ext uri="{D42A27DB-BD31-4B8C-83A1-F6EECF244321}">
-                <p14:modId xmlns:p14="http://schemas.microsoft.com/office/powerpoint/2010/main" val="2652240485"/>
+                <p14:modId xmlns:p14="http://schemas.microsoft.com/office/powerpoint/2010/main" val="104630486"/>
               </p:ext>
             </p:extLst>
           </p:nvPr>
@@ -13706,7 +12719,7 @@
                           <a:effectLst/>
                           <a:latin typeface="+mn-lt"/>
                         </a:rPr>
-                        <a:t>TBD 0.17</a:t>
+                        <a:t>0.17</a:t>
                       </a:r>
                       <a:endParaRPr lang="de-DE" sz="1600" b="0" i="0" u="none" strike="noStrike" dirty="0">
                         <a:solidFill>
@@ -13733,7 +12746,7 @@
                           <a:effectLst/>
                           <a:latin typeface="+mn-lt"/>
                         </a:rPr>
-                        <a:t>0.36</a:t>
+                        <a:t>0.39</a:t>
                       </a:r>
                       <a:endParaRPr lang="de-DE" sz="1600" b="0" i="0" u="none" strike="noStrike" dirty="0">
                         <a:solidFill>
@@ -13760,7 +12773,17 @@
                           <a:effectLst/>
                           <a:latin typeface="+mn-lt"/>
                         </a:rPr>
-                        <a:t>-0.08</a:t>
+                        <a:t>-</a:t>
+                      </a:r>
+                      <a:r>
+                        <a:rPr lang="de-DE" sz="1600" b="0" i="0" u="none" strike="noStrike" dirty="0" smtClean="0">
+                          <a:solidFill>
+                            <a:srgbClr val="000000"/>
+                          </a:solidFill>
+                          <a:effectLst/>
+                          <a:latin typeface="+mn-lt"/>
+                        </a:rPr>
+                        <a:t>0.29</a:t>
                       </a:r>
                       <a:endParaRPr lang="de-DE" sz="1600" b="0" i="0" u="none" strike="noStrike" dirty="0">
                         <a:solidFill>
@@ -13787,7 +12810,7 @@
                           <a:effectLst/>
                           <a:latin typeface="+mn-lt"/>
                         </a:rPr>
-                        <a:t>0.00</a:t>
+                        <a:t>-0.29</a:t>
                       </a:r>
                       <a:endParaRPr lang="de-DE" sz="1600" b="0" i="0" u="none" strike="noStrike" dirty="0">
                         <a:solidFill>
@@ -13937,7 +12960,7 @@
                           <a:effectLst/>
                           <a:latin typeface="+mn-lt"/>
                         </a:rPr>
-                        <a:t>0.36</a:t>
+                        <a:t>0.40</a:t>
                       </a:r>
                       <a:endParaRPr lang="de-DE" sz="1600" b="0" i="0" u="none" strike="noStrike" dirty="0">
                         <a:solidFill>
@@ -13964,7 +12987,7 @@
                           <a:effectLst/>
                           <a:latin typeface="+mn-lt"/>
                         </a:rPr>
-                        <a:t>0.00</a:t>
+                        <a:t>0.23</a:t>
                       </a:r>
                       <a:endParaRPr lang="de-DE" sz="1600" b="0" i="0" u="none" strike="noStrike" dirty="0">
                         <a:solidFill>
@@ -14018,7 +13041,7 @@
                           <a:effectLst/>
                           <a:latin typeface="+mn-lt"/>
                         </a:rPr>
-                        <a:t>0.71</a:t>
+                        <a:t>0.64</a:t>
                       </a:r>
                       <a:endParaRPr lang="de-DE" sz="1600" b="0" i="0" u="none" strike="noStrike" dirty="0">
                         <a:solidFill>
@@ -14114,7 +13137,7 @@
                           <a:effectLst/>
                           <a:latin typeface="+mn-lt"/>
                         </a:rPr>
-                        <a:t>0.20</a:t>
+                        <a:t>0.19</a:t>
                       </a:r>
                       <a:endParaRPr lang="de-DE" sz="1600" b="0" i="0" u="none" strike="noStrike" dirty="0">
                         <a:solidFill>
@@ -14141,7 +13164,7 @@
                           <a:effectLst/>
                           <a:latin typeface="+mn-lt"/>
                         </a:rPr>
-                        <a:t>0.42</a:t>
+                        <a:t>0.43</a:t>
                       </a:r>
                       <a:endParaRPr lang="de-DE" sz="1600" b="0" i="0" u="none" strike="noStrike" dirty="0">
                         <a:solidFill>
@@ -14168,7 +13191,7 @@
                           <a:effectLst/>
                           <a:latin typeface="+mn-lt"/>
                         </a:rPr>
-                        <a:t>0.00</a:t>
+                        <a:t>-0.08</a:t>
                       </a:r>
                       <a:endParaRPr lang="de-DE" sz="1600" b="0" i="0" u="none" strike="noStrike" dirty="0">
                         <a:solidFill>
@@ -14195,7 +13218,7 @@
                           <a:effectLst/>
                           <a:latin typeface="+mn-lt"/>
                         </a:rPr>
-                        <a:t>0.08</a:t>
+                        <a:t>0.15</a:t>
                       </a:r>
                       <a:endParaRPr lang="de-DE" sz="1600" b="0" i="0" u="none" strike="noStrike" dirty="0">
                         <a:solidFill>
@@ -14352,7 +13375,7 @@
                           <a:effectLst/>
                           <a:latin typeface="+mn-lt"/>
                         </a:rPr>
-                        <a:t>0.45</a:t>
+                        <a:t>0.47</a:t>
                       </a:r>
                       <a:endParaRPr lang="de-DE" sz="1600" b="0" i="0" u="none" strike="noStrike" dirty="0">
                         <a:solidFill>
@@ -14379,7 +13402,7 @@
                           <a:effectLst/>
                           <a:latin typeface="+mn-lt"/>
                         </a:rPr>
-                        <a:t>-0.55</a:t>
+                        <a:t>0.21</a:t>
                       </a:r>
                       <a:endParaRPr lang="de-DE" sz="1600" b="0" i="0" u="none" strike="noStrike" dirty="0">
                         <a:solidFill>
@@ -14406,7 +13429,17 @@
                           <a:effectLst/>
                           <a:latin typeface="+mn-lt"/>
                         </a:rPr>
-                        <a:t>-0.14</a:t>
+                        <a:t>-</a:t>
+                      </a:r>
+                      <a:r>
+                        <a:rPr lang="de-DE" sz="1600" b="0" i="0" u="none" strike="noStrike" dirty="0" smtClean="0">
+                          <a:solidFill>
+                            <a:srgbClr val="FF0000"/>
+                          </a:solidFill>
+                          <a:effectLst/>
+                          <a:latin typeface="+mn-lt"/>
+                        </a:rPr>
+                        <a:t>0.07</a:t>
                       </a:r>
                       <a:endParaRPr lang="de-DE" sz="1600" b="0" i="0" u="none" strike="noStrike" dirty="0">
                         <a:solidFill>
@@ -14433,7 +13466,7 @@
                           <a:effectLst/>
                           <a:latin typeface="+mn-lt"/>
                         </a:rPr>
-                        <a:t>0.33</a:t>
+                        <a:t>0.6</a:t>
                       </a:r>
                       <a:endParaRPr lang="de-DE" sz="1600" b="0" i="0" u="none" strike="noStrike" dirty="0">
                         <a:solidFill>
@@ -14502,7 +13535,7 @@
                           <a:effectLst/>
                           <a:latin typeface="+mn-lt"/>
                         </a:rPr>
-                        <a:t>2.7</a:t>
+                        <a:t>2.3</a:t>
                       </a:r>
                       <a:endParaRPr lang="de-DE" sz="1600" b="0" i="0" u="none" strike="noStrike" dirty="0">
                         <a:solidFill>
@@ -14529,7 +13562,7 @@
                           <a:effectLst/>
                           <a:latin typeface="+mn-lt"/>
                         </a:rPr>
-                        <a:t>0.23</a:t>
+                        <a:t>0.22</a:t>
                       </a:r>
                       <a:endParaRPr lang="de-DE" sz="1600" b="0" i="0" u="none" strike="noStrike" dirty="0">
                         <a:solidFill>
@@ -14556,7 +13589,7 @@
                           <a:effectLst/>
                           <a:latin typeface="+mn-lt"/>
                         </a:rPr>
-                        <a:t>0.41</a:t>
+                        <a:t>0.44</a:t>
                       </a:r>
                       <a:endParaRPr lang="de-DE" sz="1600" b="0" i="0" u="none" strike="noStrike" dirty="0">
                         <a:solidFill>
@@ -14583,7 +13616,7 @@
                           <a:effectLst/>
                           <a:latin typeface="+mn-lt"/>
                         </a:rPr>
-                        <a:t>0.00</a:t>
+                        <a:t>0.26</a:t>
                       </a:r>
                       <a:endParaRPr lang="de-DE" sz="1600" b="0" i="0" u="none" strike="noStrike" dirty="0">
                         <a:solidFill>
@@ -14610,7 +13643,17 @@
                           <a:effectLst/>
                           <a:latin typeface="+mn-lt"/>
                         </a:rPr>
-                        <a:t>-0.12</a:t>
+                        <a:t>-</a:t>
+                      </a:r>
+                      <a:r>
+                        <a:rPr lang="de-DE" sz="1600" b="0" i="0" u="none" strike="noStrike" dirty="0" smtClean="0">
+                          <a:solidFill>
+                            <a:srgbClr val="000000"/>
+                          </a:solidFill>
+                          <a:effectLst/>
+                          <a:latin typeface="+mn-lt"/>
+                        </a:rPr>
+                        <a:t>0.16</a:t>
                       </a:r>
                       <a:endParaRPr lang="de-DE" sz="1600" b="0" i="0" u="none" strike="noStrike" dirty="0">
                         <a:solidFill>
@@ -14637,7 +13680,7 @@
                           <a:effectLst/>
                           <a:latin typeface="+mn-lt"/>
                         </a:rPr>
-                        <a:t>0.05</a:t>
+                        <a:t>0.52</a:t>
                       </a:r>
                       <a:endParaRPr lang="de-DE" sz="1600" b="0" i="0" u="none" strike="noStrike" dirty="0">
                         <a:solidFill>
@@ -14706,7 +13749,7 @@
                           <a:effectLst/>
                           <a:latin typeface="+mn-lt"/>
                         </a:rPr>
-                        <a:t>2.3</a:t>
+                        <a:t>1.7</a:t>
                       </a:r>
                       <a:endParaRPr lang="de-DE" sz="1600" b="0" i="0" u="none" strike="noStrike" dirty="0">
                         <a:solidFill>
@@ -14733,7 +13776,7 @@
                           <a:effectLst/>
                           <a:latin typeface="+mn-lt"/>
                         </a:rPr>
-                        <a:t>0.23</a:t>
+                        <a:t>0.22</a:t>
                       </a:r>
                       <a:endParaRPr lang="de-DE" sz="1600" b="0" i="0" u="none" strike="noStrike" dirty="0">
                         <a:solidFill>
@@ -14760,7 +13803,44 @@
                           <a:effectLst/>
                           <a:latin typeface="+mn-lt"/>
                         </a:rPr>
-                        <a:t>0.43</a:t>
+                        <a:t>0.4</a:t>
+                      </a:r>
+                      <a:r>
+                        <a:rPr lang="de-DE" sz="1600" b="0" i="0" u="none" strike="noStrike" dirty="0">
+                          <a:solidFill>
+                            <a:srgbClr val="000000"/>
+                          </a:solidFill>
+                          <a:effectLst/>
+                          <a:latin typeface="+mn-lt"/>
+                        </a:rPr>
+                        <a:t>0</a:t>
+                      </a:r>
+                      <a:endParaRPr lang="de-DE" sz="1600" b="0" i="0" u="none" strike="noStrike" dirty="0" smtClean="0">
+                        <a:solidFill>
+                          <a:srgbClr val="000000"/>
+                        </a:solidFill>
+                        <a:effectLst/>
+                        <a:latin typeface="+mn-lt"/>
+                      </a:endParaRPr>
+                    </a:p>
+                  </a:txBody>
+                  <a:tcPr marL="9525" marR="9525" marT="9525" marB="0" anchor="b"/>
+                </a:tc>
+                <a:tc>
+                  <a:txBody>
+                    <a:bodyPr/>
+                    <a:lstStyle/>
+                    <a:p>
+                      <a:pPr algn="l" fontAlgn="b"/>
+                      <a:r>
+                        <a:rPr lang="de-DE" sz="1600" b="0" i="0" u="none" strike="noStrike" dirty="0" smtClean="0">
+                          <a:solidFill>
+                            <a:srgbClr val="000000"/>
+                          </a:solidFill>
+                          <a:effectLst/>
+                          <a:latin typeface="+mn-lt"/>
+                        </a:rPr>
+                        <a:t>0.45</a:t>
                       </a:r>
                       <a:endParaRPr lang="de-DE" sz="1600" b="0" i="0" u="none" strike="noStrike" dirty="0">
                         <a:solidFill>
@@ -14787,7 +13867,7 @@
                           <a:effectLst/>
                           <a:latin typeface="+mn-lt"/>
                         </a:rPr>
-                        <a:t>0.22</a:t>
+                        <a:t>0.89</a:t>
                       </a:r>
                       <a:endParaRPr lang="de-DE" sz="1600" b="0" i="0" u="none" strike="noStrike" dirty="0">
                         <a:solidFill>
@@ -14814,34 +13894,7 @@
                           <a:effectLst/>
                           <a:latin typeface="+mn-lt"/>
                         </a:rPr>
-                        <a:t>0.22</a:t>
-                      </a:r>
-                      <a:endParaRPr lang="de-DE" sz="1600" b="0" i="0" u="none" strike="noStrike" dirty="0">
-                        <a:solidFill>
-                          <a:srgbClr val="000000"/>
-                        </a:solidFill>
-                        <a:effectLst/>
-                        <a:latin typeface="+mn-lt"/>
-                      </a:endParaRPr>
-                    </a:p>
-                  </a:txBody>
-                  <a:tcPr marL="9525" marR="9525" marT="9525" marB="0" anchor="b"/>
-                </a:tc>
-                <a:tc>
-                  <a:txBody>
-                    <a:bodyPr/>
-                    <a:lstStyle/>
-                    <a:p>
-                      <a:pPr algn="l" fontAlgn="b"/>
-                      <a:r>
-                        <a:rPr lang="de-DE" sz="1600" b="0" i="0" u="none" strike="noStrike" dirty="0" smtClean="0">
-                          <a:solidFill>
-                            <a:srgbClr val="000000"/>
-                          </a:solidFill>
-                          <a:effectLst/>
-                          <a:latin typeface="+mn-lt"/>
-                        </a:rPr>
-                        <a:t>0.40</a:t>
+                        <a:t>0.4</a:t>
                       </a:r>
                       <a:endParaRPr lang="de-DE" sz="1600" b="0" i="0" u="none" strike="noStrike" dirty="0">
                         <a:solidFill>
@@ -14910,7 +13963,7 @@
                           <a:effectLst/>
                           <a:latin typeface="+mn-lt"/>
                         </a:rPr>
-                        <a:t>3.3</a:t>
+                        <a:t>2.3</a:t>
                       </a:r>
                       <a:endParaRPr lang="de-DE" sz="1600" b="0" i="0" u="none" strike="noStrike" dirty="0">
                         <a:solidFill>
@@ -14964,7 +14017,7 @@
                           <a:effectLst/>
                           <a:latin typeface="+mn-lt"/>
                         </a:rPr>
-                        <a:t>0.31</a:t>
+                        <a:t>0.35</a:t>
                       </a:r>
                       <a:endParaRPr lang="de-DE" sz="1600" b="0" i="0" u="none" strike="noStrike" dirty="0">
                         <a:solidFill>
@@ -14991,7 +14044,7 @@
                           <a:effectLst/>
                           <a:latin typeface="+mn-lt"/>
                         </a:rPr>
-                        <a:t>-0.24</a:t>
+                        <a:t>0.12</a:t>
                       </a:r>
                       <a:endParaRPr lang="de-DE" sz="1600" b="0" i="0" u="none" strike="noStrike" dirty="0">
                         <a:solidFill>
@@ -15018,7 +14071,17 @@
                           <a:effectLst/>
                           <a:latin typeface="+mn-lt"/>
                         </a:rPr>
-                        <a:t>-0.34</a:t>
+                        <a:t>-</a:t>
+                      </a:r>
+                      <a:r>
+                        <a:rPr lang="de-DE" sz="1600" b="0" i="0" u="none" strike="noStrike" dirty="0" smtClean="0">
+                          <a:solidFill>
+                            <a:srgbClr val="000000"/>
+                          </a:solidFill>
+                          <a:effectLst/>
+                          <a:latin typeface="+mn-lt"/>
+                        </a:rPr>
+                        <a:t>0.15</a:t>
                       </a:r>
                       <a:endParaRPr lang="de-DE" sz="1600" b="0" i="0" u="none" strike="noStrike" dirty="0">
                         <a:solidFill>
@@ -15045,7 +14108,7 @@
                           <a:effectLst/>
                           <a:latin typeface="+mn-lt"/>
                         </a:rPr>
-                        <a:t>0.62</a:t>
+                        <a:t>0.61</a:t>
                       </a:r>
                       <a:endParaRPr lang="de-DE" sz="1600" b="0" i="0" u="none" strike="noStrike" dirty="0">
                         <a:solidFill>
@@ -15114,7 +14177,7 @@
                           <a:effectLst/>
                           <a:latin typeface="+mn-lt"/>
                         </a:rPr>
-                        <a:t>3.0</a:t>
+                        <a:t>2.3</a:t>
                       </a:r>
                       <a:endParaRPr lang="de-DE" sz="1600" b="0" i="0" u="none" strike="noStrike" dirty="0">
                         <a:solidFill>
@@ -15141,7 +14204,7 @@
                           <a:effectLst/>
                           <a:latin typeface="+mn-lt"/>
                         </a:rPr>
-                        <a:t>0.10</a:t>
+                        <a:t>0.11</a:t>
                       </a:r>
                       <a:endParaRPr lang="de-DE" sz="1600" b="0" i="0" u="none" strike="noStrike" dirty="0">
                         <a:solidFill>
@@ -15168,7 +14231,7 @@
                           <a:effectLst/>
                           <a:latin typeface="+mn-lt"/>
                         </a:rPr>
-                        <a:t>0.37</a:t>
+                        <a:t>0.36</a:t>
                       </a:r>
                       <a:endParaRPr lang="de-DE" sz="1600" b="0" i="0" u="none" strike="noStrike" dirty="0">
                         <a:solidFill>
@@ -15195,7 +14258,7 @@
                           <a:effectLst/>
                           <a:latin typeface="+mn-lt"/>
                         </a:rPr>
-                        <a:t>0.22</a:t>
+                        <a:t>0.18</a:t>
                       </a:r>
                       <a:endParaRPr lang="de-DE" sz="1600" b="0" i="0" u="none" strike="noStrike" dirty="0">
                         <a:solidFill>
@@ -15222,7 +14285,7 @@
                           <a:effectLst/>
                           <a:latin typeface="+mn-lt"/>
                         </a:rPr>
-                        <a:t>0.55</a:t>
+                        <a:t>0.30</a:t>
                       </a:r>
                       <a:endParaRPr lang="de-DE" sz="1600" b="0" i="0" u="none" strike="noStrike" dirty="0">
                         <a:solidFill>
@@ -15249,7 +14312,7 @@
                           <a:effectLst/>
                           <a:latin typeface="+mn-lt"/>
                         </a:rPr>
-                        <a:t>0.22</a:t>
+                        <a:t>0.55</a:t>
                       </a:r>
                       <a:endParaRPr lang="de-DE" sz="1600" b="0" i="0" u="none" strike="noStrike" dirty="0">
                         <a:solidFill>
@@ -15352,7 +14415,7 @@
           <a:p>
             <a:fld id="{091C8288-C28E-4174-AD60-3EFEB5F00A50}" type="datetime1">
               <a:rPr lang="de-DE" smtClean="0"/>
-              <a:t>26.05.2014</a:t>
+              <a:t>28.05.2014</a:t>
             </a:fld>
             <a:endParaRPr lang="de-DE"/>
           </a:p>
@@ -15624,7 +14687,7 @@
           <a:p>
             <a:fld id="{F4B76305-BBD0-4F82-8092-408659DD46D8}" type="datetime1">
               <a:rPr lang="de-DE" smtClean="0"/>
-              <a:t>26.05.2014</a:t>
+              <a:t>28.05.2014</a:t>
             </a:fld>
             <a:endParaRPr lang="de-DE"/>
           </a:p>
@@ -15767,7 +14830,7 @@
           <p:nvPr>
             <p:extLst>
               <p:ext uri="{D42A27DB-BD31-4B8C-83A1-F6EECF244321}">
-                <p14:modId xmlns:p14="http://schemas.microsoft.com/office/powerpoint/2010/main" val="3023526771"/>
+                <p14:modId xmlns:p14="http://schemas.microsoft.com/office/powerpoint/2010/main" val="2425070136"/>
               </p:ext>
             </p:extLst>
           </p:nvPr>
@@ -15783,8 +14846,8 @@
                 <a:tableStyleId>{5C22544A-7EE6-4342-B048-85BDC9FD1C3A}</a:tableStyleId>
               </a:tblPr>
               <a:tblGrid>
-                <a:gridCol w="954106"/>
-                <a:gridCol w="954106"/>
+                <a:gridCol w="936104"/>
+                <a:gridCol w="972108"/>
                 <a:gridCol w="954106"/>
                 <a:gridCol w="954106"/>
                 <a:gridCol w="954106"/>
@@ -16305,7 +15368,7 @@
                           <a:effectLst/>
                           <a:latin typeface="+mn-lt"/>
                         </a:rPr>
-                        <a:t>0.45</a:t>
+                        <a:t>0.47</a:t>
                       </a:r>
                       <a:endParaRPr lang="de-DE" sz="1600" b="0" i="0" u="none" strike="noStrike" dirty="0">
                         <a:solidFill>
@@ -16332,7 +15395,7 @@
                           <a:effectLst/>
                           <a:latin typeface="+mn-lt"/>
                         </a:rPr>
-                        <a:t>-0.55</a:t>
+                        <a:t>0.21</a:t>
                       </a:r>
                       <a:endParaRPr lang="de-DE" sz="1600" b="0" i="0" u="none" strike="noStrike" dirty="0">
                         <a:solidFill>
@@ -16359,7 +15422,17 @@
                           <a:effectLst/>
                           <a:latin typeface="+mn-lt"/>
                         </a:rPr>
-                        <a:t>-0.14</a:t>
+                        <a:t>-</a:t>
+                      </a:r>
+                      <a:r>
+                        <a:rPr lang="de-DE" sz="1600" b="0" i="0" u="none" strike="noStrike" dirty="0" smtClean="0">
+                          <a:solidFill>
+                            <a:srgbClr val="FF0000"/>
+                          </a:solidFill>
+                          <a:effectLst/>
+                          <a:latin typeface="+mn-lt"/>
+                        </a:rPr>
+                        <a:t>0.07</a:t>
                       </a:r>
                       <a:endParaRPr lang="de-DE" sz="1600" b="0" i="0" u="none" strike="noStrike" dirty="0">
                         <a:solidFill>
@@ -16386,7 +15459,7 @@
                           <a:effectLst/>
                           <a:latin typeface="+mn-lt"/>
                         </a:rPr>
-                        <a:t>0.33</a:t>
+                        <a:t>0.6</a:t>
                       </a:r>
                       <a:endParaRPr lang="de-DE" sz="1600" b="0" i="0" u="none" strike="noStrike" dirty="0">
                         <a:solidFill>
@@ -16478,7 +15551,7 @@
           <a:p>
             <a:fld id="{78473100-AED5-4DA1-B2F3-5647C53D63F4}" type="datetime1">
               <a:rPr lang="de-DE" smtClean="0"/>
-              <a:t>26.05.2014</a:t>
+              <a:t>28.05.2014</a:t>
             </a:fld>
             <a:endParaRPr lang="de-DE"/>
           </a:p>
@@ -16742,7 +15815,7 @@
           <a:p>
             <a:fld id="{5EC1ED9E-860E-458F-8F79-3C5ABDB329B1}" type="datetime1">
               <a:rPr lang="de-DE" smtClean="0"/>
-              <a:t>26.05.2014</a:t>
+              <a:t>28.05.2014</a:t>
             </a:fld>
             <a:endParaRPr lang="de-DE"/>
           </a:p>
@@ -16970,7 +16043,7 @@
           <a:p>
             <a:fld id="{DACB07A8-6F48-4EEC-9F7D-1BD3C0448DE6}" type="datetime1">
               <a:rPr lang="de-DE" smtClean="0"/>
-              <a:t>26.05.2014</a:t>
+              <a:t>28.05.2014</a:t>
             </a:fld>
             <a:endParaRPr lang="de-DE"/>
           </a:p>
@@ -17476,7 +16549,7 @@
           <a:p>
             <a:fld id="{DDCC3AEE-B605-4AA0-A8D8-B69E526B4BA9}" type="datetime1">
               <a:rPr lang="de-DE" smtClean="0"/>
-              <a:t>26.05.2014</a:t>
+              <a:t>28.05.2014</a:t>
             </a:fld>
             <a:endParaRPr lang="de-DE"/>
           </a:p>
@@ -17982,7 +17055,7 @@
           <a:p>
             <a:fld id="{1EB280F1-C55D-4C61-97C9-643E3B82A47F}" type="datetime1">
               <a:rPr lang="de-DE" smtClean="0"/>
-              <a:t>26.05.2014</a:t>
+              <a:t>28.05.2014</a:t>
             </a:fld>
             <a:endParaRPr lang="de-DE"/>
           </a:p>
@@ -18445,7 +17518,7 @@
           <a:p>
             <a:fld id="{F1DB1523-DF58-40DE-9061-65830FEA9638}" type="datetime1">
               <a:rPr lang="de-DE" smtClean="0"/>
-              <a:t>26.05.2014</a:t>
+              <a:t>28.05.2014</a:t>
             </a:fld>
             <a:endParaRPr lang="de-DE"/>
           </a:p>
@@ -18948,7 +18021,7 @@
           <a:p>
             <a:fld id="{3D983B67-D502-4F61-8C3B-4478A6B8847C}" type="datetime1">
               <a:rPr lang="de-DE" smtClean="0"/>
-              <a:t>26.05.2014</a:t>
+              <a:t>28.05.2014</a:t>
             </a:fld>
             <a:endParaRPr lang="de-DE"/>
           </a:p>
@@ -19231,7 +18304,7 @@
           <a:p>
             <a:fld id="{94D4713E-42FA-4ABD-B142-0D6E0F21C959}" type="datetime1">
               <a:rPr lang="de-DE" smtClean="0"/>
-              <a:t>26.05.2014</a:t>
+              <a:t>28.05.2014</a:t>
             </a:fld>
             <a:endParaRPr lang="de-DE"/>
           </a:p>
@@ -19544,7 +18617,7 @@
           <a:p>
             <a:fld id="{A0C5D4C8-B20B-4E7D-8DF8-EACCE7B54E7E}" type="datetime1">
               <a:rPr lang="de-DE" smtClean="0"/>
-              <a:t>26.05.2014</a:t>
+              <a:t>28.05.2014</a:t>
             </a:fld>
             <a:endParaRPr lang="de-DE"/>
           </a:p>
@@ -19873,7 +18946,7 @@
           <a:p>
             <a:fld id="{622E3DF2-A601-488B-90F4-43C0E161729E}" type="datetime1">
               <a:rPr lang="de-DE" smtClean="0"/>
-              <a:t>26.05.2014</a:t>
+              <a:t>28.05.2014</a:t>
             </a:fld>
             <a:endParaRPr lang="de-DE"/>
           </a:p>
@@ -20219,7 +19292,7 @@
           <a:p>
             <a:fld id="{966E9018-A445-4F6E-9E79-5C76A3846E3C}" type="datetime1">
               <a:rPr lang="de-DE" smtClean="0"/>
-              <a:t>26.05.2014</a:t>
+              <a:t>28.05.2014</a:t>
             </a:fld>
             <a:endParaRPr lang="de-DE"/>
           </a:p>
@@ -20693,7 +19766,7 @@
           <a:p>
             <a:fld id="{857AD9AB-F381-4932-9AA9-7C2279933414}" type="datetime1">
               <a:rPr lang="de-DE" smtClean="0"/>
-              <a:t>26.05.2014</a:t>
+              <a:t>28.05.2014</a:t>
             </a:fld>
             <a:endParaRPr lang="de-DE"/>
           </a:p>
@@ -21055,7 +20128,7 @@
           <a:p>
             <a:fld id="{2D6D1381-BB56-403F-86F2-347215917219}" type="datetime1">
               <a:rPr lang="de-DE" smtClean="0"/>
-              <a:t>26.05.2014</a:t>
+              <a:t>28.05.2014</a:t>
             </a:fld>
             <a:endParaRPr lang="de-DE"/>
           </a:p>
@@ -21359,7 +20432,7 @@
           <a:p>
             <a:fld id="{8F93E769-E6EC-4FC7-B434-E34C83387336}" type="datetime1">
               <a:rPr lang="de-DE" smtClean="0"/>
-              <a:t>26.05.2014</a:t>
+              <a:t>28.05.2014</a:t>
             </a:fld>
             <a:endParaRPr lang="de-DE"/>
           </a:p>
@@ -21735,7 +20808,7 @@
           <a:p>
             <a:fld id="{0897F65B-465B-4E8A-9C1E-DBA98210641D}" type="datetime1">
               <a:rPr lang="de-DE" smtClean="0"/>
-              <a:t>26.05.2014</a:t>
+              <a:t>28.05.2014</a:t>
             </a:fld>
             <a:endParaRPr lang="de-DE"/>
           </a:p>
@@ -21938,7 +21011,7 @@
           <a:p>
             <a:fld id="{4A63847A-3EFA-4891-A495-24CAECE3A301}" type="datetime1">
               <a:rPr lang="de-DE" smtClean="0"/>
-              <a:t>26.05.2014</a:t>
+              <a:t>28.05.2014</a:t>
             </a:fld>
             <a:endParaRPr lang="de-DE"/>
           </a:p>
@@ -22241,7 +21314,7 @@
           <a:p>
             <a:fld id="{4E2BB8F5-F3C7-4B29-AAAC-21A90E56890C}" type="datetime1">
               <a:rPr lang="de-DE" smtClean="0"/>
-              <a:t>26.05.2014</a:t>
+              <a:t>28.05.2014</a:t>
             </a:fld>
             <a:endParaRPr lang="de-DE"/>
           </a:p>
@@ -22564,7 +21637,7 @@
           <a:p>
             <a:fld id="{8DF76280-5C57-41E4-AF35-58B8D14F4E99}" type="datetime1">
               <a:rPr lang="de-DE" smtClean="0"/>
-              <a:t>26.05.2014</a:t>
+              <a:t>28.05.2014</a:t>
             </a:fld>
             <a:endParaRPr lang="de-DE"/>
           </a:p>
@@ -22831,7 +21904,7 @@
           <a:p>
             <a:fld id="{3621AA0C-6B83-49A0-95A5-C75A92280818}" type="datetime1">
               <a:rPr lang="de-DE" smtClean="0"/>
-              <a:t>26.05.2014</a:t>
+              <a:t>28.05.2014</a:t>
             </a:fld>
             <a:endParaRPr lang="de-DE"/>
           </a:p>
@@ -23300,7 +22373,7 @@
           <a:p>
             <a:fld id="{D3261F99-812A-49D3-8EFD-E321A9F3F1DE}" type="datetime1">
               <a:rPr lang="de-DE" smtClean="0"/>
-              <a:t>26.05.2014</a:t>
+              <a:t>28.05.2014</a:t>
             </a:fld>
             <a:endParaRPr lang="de-DE"/>
           </a:p>
@@ -23606,7 +22679,7 @@
           <a:p>
             <a:fld id="{B8BCBBA1-FE20-4EA8-8A08-FCB3B4B024D7}" type="datetime1">
               <a:rPr lang="de-DE" smtClean="0"/>
-              <a:t>26.05.2014</a:t>
+              <a:t>28.05.2014</a:t>
             </a:fld>
             <a:endParaRPr lang="de-DE"/>
           </a:p>

</xml_diff>